<commit_message>
Big clean up for submission
</commit_message>
<xml_diff>
--- a/figures/Figure_1.pptx
+++ b/figures/Figure_1.pptx
@@ -158,26 +158,24 @@
             </a:pPr>
             <a:r>
               <a:rPr lang="en-US" b="1" dirty="0"/>
-              <a:t>Host</a:t>
-            </a:r>
-            <a:r>
-              <a:rPr lang="en-US" baseline="0" dirty="0"/>
-              <a:t> </a:t>
-            </a:r>
-            <a:r>
-              <a:rPr lang="en-US" b="1" baseline="0" dirty="0">
-                <a:latin typeface="Gill Sans MT" panose="020B0502020104020203" pitchFamily="34" charset="77"/>
-              </a:rPr>
-              <a:t>sample</a:t>
+              <a:t>Sample </a:t>
             </a:r>
             <a:r>
               <a:rPr lang="en-US" b="1" baseline="0" dirty="0"/>
-              <a:t> 2</a:t>
+              <a:t>3</a:t>
             </a:r>
             <a:endParaRPr lang="en-US" b="1" dirty="0"/>
           </a:p>
         </c:rich>
       </c:tx>
+      <c:layout>
+        <c:manualLayout>
+          <c:xMode val="edge"/>
+          <c:yMode val="edge"/>
+          <c:x val="0.38148904245816367"/>
+          <c:y val="2.6047181289919997E-2"/>
+        </c:manualLayout>
+      </c:layout>
       <c:overlay val="0"/>
       <c:spPr>
         <a:noFill/>
@@ -238,7 +236,7 @@
             <c:bubble3D val="0"/>
             <c:spPr>
               <a:solidFill>
-                <a:srgbClr val="00B0F0"/>
+                <a:srgbClr val="51A145"/>
               </a:solidFill>
               <a:ln w="19050">
                 <a:solidFill>
@@ -258,7 +256,7 @@
             <c:bubble3D val="0"/>
             <c:spPr>
               <a:solidFill>
-                <a:srgbClr val="E3F0D9"/>
+                <a:srgbClr val="00B0F0"/>
               </a:solidFill>
               <a:ln w="19050">
                 <a:solidFill>
@@ -273,57 +271,31 @@
               </c:ext>
             </c:extLst>
           </c:dPt>
-          <c:dPt>
-            <c:idx val="2"/>
-            <c:bubble3D val="0"/>
-            <c:spPr>
-              <a:solidFill>
-                <a:srgbClr val="51A145"/>
-              </a:solidFill>
-              <a:ln w="19050">
-                <a:solidFill>
-                  <a:schemeClr val="tx1"/>
-                </a:solidFill>
-              </a:ln>
-              <a:effectLst/>
-            </c:spPr>
-            <c:extLst>
-              <c:ext xmlns:c16="http://schemas.microsoft.com/office/drawing/2014/chart" uri="{C3380CC4-5D6E-409C-BE32-E72D297353CC}">
-                <c16:uniqueId val="{00000002-89FA-9D4E-A555-92607FC151FA}"/>
-              </c:ext>
-            </c:extLst>
-          </c:dPt>
           <c:cat>
             <c:strRef>
-              <c:f>Sheet1!$A$2:$A$4</c:f>
+              <c:f>Sheet1!$A$2:$A$3</c:f>
               <c:strCache>
-                <c:ptCount val="3"/>
+                <c:ptCount val="2"/>
                 <c:pt idx="0">
                   <c:v>Bacteria/Archaea</c:v>
                 </c:pt>
                 <c:pt idx="1">
                   <c:v>Host</c:v>
                 </c:pt>
-                <c:pt idx="2">
-                  <c:v>Diet/Fungal</c:v>
-                </c:pt>
               </c:strCache>
             </c:strRef>
           </c:cat>
           <c:val>
             <c:numRef>
-              <c:f>Sheet1!$B$2:$B$4</c:f>
+              <c:f>Sheet1!$B$2:$B$3</c:f>
               <c:numCache>
                 <c:formatCode>General</c:formatCode>
-                <c:ptCount val="3"/>
+                <c:ptCount val="2"/>
                 <c:pt idx="0">
-                  <c:v>2.5</c:v>
+                  <c:v>50</c:v>
                 </c:pt>
                 <c:pt idx="1">
-                  <c:v>2.5</c:v>
-                </c:pt>
-                <c:pt idx="2">
-                  <c:v>5</c:v>
+                  <c:v>50</c:v>
                 </c:pt>
               </c:numCache>
             </c:numRef>
@@ -424,11 +396,31 @@
               <a:rPr lang="en-US" b="1" dirty="0">
                 <a:latin typeface="Gill Sans MT" panose="020B0502020104020203" pitchFamily="34" charset="77"/>
               </a:rPr>
-              <a:t>Host sample 1</a:t>
+              <a:t>Sample</a:t>
+            </a:r>
+            <a:r>
+              <a:rPr lang="en-US" b="1" baseline="0" dirty="0">
+                <a:latin typeface="Gill Sans MT" panose="020B0502020104020203" pitchFamily="34" charset="77"/>
+              </a:rPr>
+              <a:t> </a:t>
+            </a:r>
+            <a:r>
+              <a:rPr lang="en-US" b="1" dirty="0">
+                <a:latin typeface="Gill Sans MT" panose="020B0502020104020203" pitchFamily="34" charset="77"/>
+              </a:rPr>
+              <a:t>1</a:t>
             </a:r>
           </a:p>
         </c:rich>
       </c:tx>
+      <c:layout>
+        <c:manualLayout>
+          <c:xMode val="edge"/>
+          <c:yMode val="edge"/>
+          <c:x val="0.46986839467412794"/>
+          <c:y val="2.3448601519404755E-2"/>
+        </c:manualLayout>
+      </c:layout>
       <c:overlay val="0"/>
       <c:spPr>
         <a:noFill/>
@@ -478,6 +470,9 @@
             </c:strRef>
           </c:tx>
           <c:spPr>
+            <a:solidFill>
+              <a:srgbClr val="00B0F0"/>
+            </a:solidFill>
             <a:ln>
               <a:solidFill>
                 <a:schemeClr val="tx1"/>
@@ -489,7 +484,7 @@
             <c:bubble3D val="0"/>
             <c:spPr>
               <a:solidFill>
-                <a:srgbClr val="51A145"/>
+                <a:srgbClr val="00B0F0"/>
               </a:solidFill>
               <a:ln w="19050">
                 <a:solidFill>
@@ -509,7 +504,7 @@
             <c:bubble3D val="0"/>
             <c:spPr>
               <a:solidFill>
-                <a:srgbClr val="E3F0D9"/>
+                <a:schemeClr val="tx1"/>
               </a:solidFill>
               <a:ln w="19050">
                 <a:solidFill>
@@ -529,7 +524,7 @@
             <c:bubble3D val="0"/>
             <c:spPr>
               <a:solidFill>
-                <a:srgbClr val="00B0F0"/>
+                <a:srgbClr val="51A145"/>
               </a:solidFill>
               <a:ln w="19050">
                 <a:solidFill>
@@ -550,13 +545,13 @@
               <c:strCache>
                 <c:ptCount val="3"/>
                 <c:pt idx="0">
-                  <c:v>Diet/Fungal</c:v>
+                  <c:v>Bacterial/Archaeal</c:v>
                 </c:pt>
                 <c:pt idx="1">
-                  <c:v>Host</c:v>
+                  <c:v>Unmapped (Bacterial/Archaeal)</c:v>
                 </c:pt>
                 <c:pt idx="2">
-                  <c:v>Bacteria/Archaea</c:v>
+                  <c:v>Unmapped (non-microbial)</c:v>
                 </c:pt>
               </c:strCache>
             </c:strRef>
@@ -568,13 +563,13 @@
                 <c:formatCode>General</c:formatCode>
                 <c:ptCount val="3"/>
                 <c:pt idx="0">
-                  <c:v>1</c:v>
+                  <c:v>100</c:v>
                 </c:pt>
                 <c:pt idx="1">
-                  <c:v>4</c:v>
+                  <c:v>0</c:v>
                 </c:pt>
                 <c:pt idx="2">
-                  <c:v>95</c:v>
+                  <c:v>0</c:v>
                 </c:pt>
               </c:numCache>
             </c:numRef>
@@ -610,10 +605,10 @@
         <c:manualLayout>
           <c:xMode val="edge"/>
           <c:yMode val="edge"/>
-          <c:x val="0.73166282115883874"/>
-          <c:y val="3.563145696164758E-2"/>
-          <c:w val="0.20970669039782097"/>
-          <c:h val="0.22957768026712105"/>
+          <c:x val="0.43716197398341333"/>
+          <c:y val="0.8797811433085746"/>
+          <c:w val="0.53173271493379126"/>
+          <c:h val="0.1152210273026192"/>
         </c:manualLayout>
       </c:layout>
       <c:overlay val="0"/>
@@ -645,6 +640,248 @@
         </a:p>
       </c:txPr>
     </c:legend>
+    <c:plotVisOnly val="1"/>
+    <c:dispBlanksAs val="gap"/>
+    <c:extLst>
+      <c:ext xmlns:c16r3="http://schemas.microsoft.com/office/drawing/2017/03/chart" uri="{56B9EC1D-385E-4148-901F-78D8002777C0}">
+        <c16r3:dataDisplayOptions16>
+          <c16r3:dispNaAsBlank val="1"/>
+        </c16r3:dataDisplayOptions16>
+      </c:ext>
+    </c:extLst>
+    <c:showDLblsOverMax val="0"/>
+  </c:chart>
+  <c:spPr>
+    <a:noFill/>
+    <a:ln>
+      <a:noFill/>
+    </a:ln>
+    <a:effectLst/>
+  </c:spPr>
+  <c:txPr>
+    <a:bodyPr/>
+    <a:lstStyle/>
+    <a:p>
+      <a:pPr>
+        <a:defRPr/>
+      </a:pPr>
+      <a:endParaRPr lang="en-US"/>
+    </a:p>
+  </c:txPr>
+  <c:externalData r:id="rId3">
+    <c:autoUpdate val="0"/>
+  </c:externalData>
+</c:chartSpace>
+</file>
+
+<file path=ppt/charts/chart3.xml><?xml version="1.0" encoding="utf-8"?>
+<c:chartSpace xmlns:c="http://schemas.openxmlformats.org/drawingml/2006/chart" xmlns:a="http://schemas.openxmlformats.org/drawingml/2006/main" xmlns:r="http://schemas.openxmlformats.org/officeDocument/2006/relationships" xmlns:c16r2="http://schemas.microsoft.com/office/drawing/2015/06/chart">
+  <c:date1904 val="0"/>
+  <c:lang val="en-GB"/>
+  <c:roundedCorners val="0"/>
+  <mc:AlternateContent xmlns:mc="http://schemas.openxmlformats.org/markup-compatibility/2006">
+    <mc:Choice xmlns:c14="http://schemas.microsoft.com/office/drawing/2007/8/2/chart" Requires="c14">
+      <c14:style val="102"/>
+    </mc:Choice>
+    <mc:Fallback>
+      <c:style val="2"/>
+    </mc:Fallback>
+  </mc:AlternateContent>
+  <c:chart>
+    <c:title>
+      <c:tx>
+        <c:rich>
+          <a:bodyPr rot="0" spcFirstLastPara="1" vertOverflow="ellipsis" vert="horz" wrap="square" anchor="ctr" anchorCtr="1"/>
+          <a:lstStyle/>
+          <a:p>
+            <a:pPr>
+              <a:defRPr sz="1862" b="0" i="0" u="none" strike="noStrike" kern="1200" spc="0" baseline="0">
+                <a:solidFill>
+                  <a:schemeClr val="tx1">
+                    <a:lumMod val="65000"/>
+                    <a:lumOff val="35000"/>
+                  </a:schemeClr>
+                </a:solidFill>
+                <a:latin typeface="+mn-lt"/>
+                <a:ea typeface="+mn-ea"/>
+                <a:cs typeface="+mn-cs"/>
+              </a:defRPr>
+            </a:pPr>
+            <a:r>
+              <a:rPr lang="en-US" b="1" dirty="0"/>
+              <a:t>S</a:t>
+            </a:r>
+            <a:r>
+              <a:rPr lang="en-US" b="1" baseline="0" dirty="0">
+                <a:latin typeface="Gill Sans MT" panose="020B0502020104020203" pitchFamily="34" charset="77"/>
+              </a:rPr>
+              <a:t>ample</a:t>
+            </a:r>
+            <a:r>
+              <a:rPr lang="en-US" b="1" baseline="0" dirty="0"/>
+              <a:t> 2</a:t>
+            </a:r>
+            <a:endParaRPr lang="en-US" b="1" dirty="0"/>
+          </a:p>
+        </c:rich>
+      </c:tx>
+      <c:layout>
+        <c:manualLayout>
+          <c:xMode val="edge"/>
+          <c:yMode val="edge"/>
+          <c:x val="0.3860697404206328"/>
+          <c:y val="2.2791283628679996E-2"/>
+        </c:manualLayout>
+      </c:layout>
+      <c:overlay val="0"/>
+      <c:spPr>
+        <a:noFill/>
+        <a:ln>
+          <a:noFill/>
+        </a:ln>
+        <a:effectLst/>
+      </c:spPr>
+      <c:txPr>
+        <a:bodyPr rot="0" spcFirstLastPara="1" vertOverflow="ellipsis" vert="horz" wrap="square" anchor="ctr" anchorCtr="1"/>
+        <a:lstStyle/>
+        <a:p>
+          <a:pPr>
+            <a:defRPr sz="1862" b="0" i="0" u="none" strike="noStrike" kern="1200" spc="0" baseline="0">
+              <a:solidFill>
+                <a:schemeClr val="tx1">
+                  <a:lumMod val="65000"/>
+                  <a:lumOff val="35000"/>
+                </a:schemeClr>
+              </a:solidFill>
+              <a:latin typeface="+mn-lt"/>
+              <a:ea typeface="+mn-ea"/>
+              <a:cs typeface="+mn-cs"/>
+            </a:defRPr>
+          </a:pPr>
+          <a:endParaRPr lang="en-US"/>
+        </a:p>
+      </c:txPr>
+    </c:title>
+    <c:autoTitleDeleted val="0"/>
+    <c:plotArea>
+      <c:layout/>
+      <c:pieChart>
+        <c:varyColors val="1"/>
+        <c:ser>
+          <c:idx val="0"/>
+          <c:order val="0"/>
+          <c:tx>
+            <c:strRef>
+              <c:f>Sheet1!$B$1</c:f>
+              <c:strCache>
+                <c:ptCount val="1"/>
+                <c:pt idx="0">
+                  <c:v>Sales</c:v>
+                </c:pt>
+              </c:strCache>
+            </c:strRef>
+          </c:tx>
+          <c:spPr>
+            <a:ln>
+              <a:solidFill>
+                <a:schemeClr val="tx1"/>
+              </a:solidFill>
+            </a:ln>
+          </c:spPr>
+          <c:dPt>
+            <c:idx val="0"/>
+            <c:bubble3D val="0"/>
+            <c:spPr>
+              <a:solidFill>
+                <a:schemeClr val="tx1"/>
+              </a:solidFill>
+              <a:ln w="19050">
+                <a:solidFill>
+                  <a:schemeClr val="tx1"/>
+                </a:solidFill>
+              </a:ln>
+              <a:effectLst/>
+            </c:spPr>
+            <c:extLst>
+              <c:ext xmlns:c16="http://schemas.microsoft.com/office/drawing/2014/chart" uri="{C3380CC4-5D6E-409C-BE32-E72D297353CC}">
+                <c16:uniqueId val="{00000001-52C1-D847-AAF7-3D9859BDC361}"/>
+              </c:ext>
+            </c:extLst>
+          </c:dPt>
+          <c:dPt>
+            <c:idx val="1"/>
+            <c:bubble3D val="0"/>
+            <c:spPr>
+              <a:solidFill>
+                <a:srgbClr val="00B0F0"/>
+              </a:solidFill>
+              <a:ln w="19050">
+                <a:solidFill>
+                  <a:schemeClr val="tx1"/>
+                </a:solidFill>
+              </a:ln>
+              <a:effectLst/>
+            </c:spPr>
+            <c:extLst>
+              <c:ext xmlns:c16="http://schemas.microsoft.com/office/drawing/2014/chart" uri="{C3380CC4-5D6E-409C-BE32-E72D297353CC}">
+                <c16:uniqueId val="{00000003-52C1-D847-AAF7-3D9859BDC361}"/>
+              </c:ext>
+            </c:extLst>
+          </c:dPt>
+          <c:cat>
+            <c:strRef>
+              <c:f>Sheet1!$A$2:$A$3</c:f>
+              <c:strCache>
+                <c:ptCount val="2"/>
+                <c:pt idx="0">
+                  <c:v>Diet/Fungal</c:v>
+                </c:pt>
+                <c:pt idx="1">
+                  <c:v>Unknown</c:v>
+                </c:pt>
+              </c:strCache>
+            </c:strRef>
+          </c:cat>
+          <c:val>
+            <c:numRef>
+              <c:f>Sheet1!$B$2:$B$3</c:f>
+              <c:numCache>
+                <c:formatCode>General</c:formatCode>
+                <c:ptCount val="2"/>
+                <c:pt idx="0">
+                  <c:v>50</c:v>
+                </c:pt>
+                <c:pt idx="1">
+                  <c:v>50</c:v>
+                </c:pt>
+              </c:numCache>
+            </c:numRef>
+          </c:val>
+          <c:extLst>
+            <c:ext xmlns:c16="http://schemas.microsoft.com/office/drawing/2014/chart" uri="{C3380CC4-5D6E-409C-BE32-E72D297353CC}">
+              <c16:uniqueId val="{00000006-52C1-D847-AAF7-3D9859BDC361}"/>
+            </c:ext>
+          </c:extLst>
+        </c:ser>
+        <c:dLbls>
+          <c:showLegendKey val="0"/>
+          <c:showVal val="0"/>
+          <c:showCatName val="0"/>
+          <c:showSerName val="0"/>
+          <c:showPercent val="0"/>
+          <c:showBubbleSize val="0"/>
+          <c:showLeaderLines val="1"/>
+        </c:dLbls>
+        <c:firstSliceAng val="0"/>
+      </c:pieChart>
+      <c:spPr>
+        <a:noFill/>
+        <a:ln>
+          <a:noFill/>
+        </a:ln>
+        <a:effectLst/>
+      </c:spPr>
+    </c:plotArea>
     <c:plotVisOnly val="1"/>
     <c:dispBlanksAs val="gap"/>
     <c:extLst>
@@ -759,6 +996,46 @@
 </cs:colorStyle>
 </file>
 
+<file path=ppt/charts/colors3.xml><?xml version="1.0" encoding="utf-8"?>
+<cs:colorStyle xmlns:cs="http://schemas.microsoft.com/office/drawing/2012/chartStyle" xmlns:a="http://schemas.openxmlformats.org/drawingml/2006/main" meth="cycle" id="10">
+  <a:schemeClr val="accent1"/>
+  <a:schemeClr val="accent2"/>
+  <a:schemeClr val="accent3"/>
+  <a:schemeClr val="accent4"/>
+  <a:schemeClr val="accent5"/>
+  <a:schemeClr val="accent6"/>
+  <cs:variation/>
+  <cs:variation>
+    <a:lumMod val="60000"/>
+  </cs:variation>
+  <cs:variation>
+    <a:lumMod val="80000"/>
+    <a:lumOff val="20000"/>
+  </cs:variation>
+  <cs:variation>
+    <a:lumMod val="80000"/>
+  </cs:variation>
+  <cs:variation>
+    <a:lumMod val="60000"/>
+    <a:lumOff val="40000"/>
+  </cs:variation>
+  <cs:variation>
+    <a:lumMod val="50000"/>
+  </cs:variation>
+  <cs:variation>
+    <a:lumMod val="70000"/>
+    <a:lumOff val="30000"/>
+  </cs:variation>
+  <cs:variation>
+    <a:lumMod val="70000"/>
+  </cs:variation>
+  <cs:variation>
+    <a:lumMod val="50000"/>
+    <a:lumOff val="50000"/>
+  </cs:variation>
+</cs:colorStyle>
+</file>
+
 <file path=ppt/charts/style1.xml><?xml version="1.0" encoding="utf-8"?>
 <cs:chartStyle xmlns:cs="http://schemas.microsoft.com/office/drawing/2012/chartStyle" xmlns:a="http://schemas.openxmlformats.org/drawingml/2006/main" id="251">
   <cs:axisTitle>
@@ -1279,6 +1556,525 @@
 </file>
 
 <file path=ppt/charts/style2.xml><?xml version="1.0" encoding="utf-8"?>
+<cs:chartStyle xmlns:cs="http://schemas.microsoft.com/office/drawing/2012/chartStyle" xmlns:a="http://schemas.openxmlformats.org/drawingml/2006/main" id="251">
+  <cs:axisTitle>
+    <cs:lnRef idx="0"/>
+    <cs:fillRef idx="0"/>
+    <cs:effectRef idx="0"/>
+    <cs:fontRef idx="minor">
+      <a:schemeClr val="tx1">
+        <a:lumMod val="65000"/>
+        <a:lumOff val="35000"/>
+      </a:schemeClr>
+    </cs:fontRef>
+    <cs:defRPr sz="1330" kern="1200"/>
+  </cs:axisTitle>
+  <cs:categoryAxis>
+    <cs:lnRef idx="0"/>
+    <cs:fillRef idx="0"/>
+    <cs:effectRef idx="0"/>
+    <cs:fontRef idx="minor">
+      <a:schemeClr val="tx1">
+        <a:lumMod val="65000"/>
+        <a:lumOff val="35000"/>
+      </a:schemeClr>
+    </cs:fontRef>
+    <cs:spPr>
+      <a:ln w="9525" cap="flat" cmpd="sng" algn="ctr">
+        <a:solidFill>
+          <a:schemeClr val="tx1">
+            <a:lumMod val="15000"/>
+            <a:lumOff val="85000"/>
+          </a:schemeClr>
+        </a:solidFill>
+        <a:round/>
+      </a:ln>
+    </cs:spPr>
+    <cs:defRPr sz="1197" kern="1200"/>
+  </cs:categoryAxis>
+  <cs:chartArea mods="allowNoFillOverride allowNoLineOverride">
+    <cs:lnRef idx="0"/>
+    <cs:fillRef idx="0"/>
+    <cs:effectRef idx="0"/>
+    <cs:fontRef idx="minor">
+      <a:schemeClr val="tx1"/>
+    </cs:fontRef>
+    <cs:spPr>
+      <a:solidFill>
+        <a:schemeClr val="bg1"/>
+      </a:solidFill>
+      <a:ln w="9525" cap="flat" cmpd="sng" algn="ctr">
+        <a:solidFill>
+          <a:schemeClr val="tx1">
+            <a:lumMod val="15000"/>
+            <a:lumOff val="85000"/>
+          </a:schemeClr>
+        </a:solidFill>
+        <a:round/>
+      </a:ln>
+    </cs:spPr>
+    <cs:defRPr sz="1197" kern="1200"/>
+  </cs:chartArea>
+  <cs:dataLabel>
+    <cs:lnRef idx="0"/>
+    <cs:fillRef idx="0"/>
+    <cs:effectRef idx="0"/>
+    <cs:fontRef idx="minor">
+      <a:schemeClr val="tx1">
+        <a:lumMod val="75000"/>
+        <a:lumOff val="25000"/>
+      </a:schemeClr>
+    </cs:fontRef>
+    <cs:defRPr sz="1197" kern="1200"/>
+  </cs:dataLabel>
+  <cs:dataLabelCallout>
+    <cs:lnRef idx="0"/>
+    <cs:fillRef idx="0"/>
+    <cs:effectRef idx="0"/>
+    <cs:fontRef idx="minor">
+      <a:schemeClr val="dk1">
+        <a:lumMod val="65000"/>
+        <a:lumOff val="35000"/>
+      </a:schemeClr>
+    </cs:fontRef>
+    <cs:spPr>
+      <a:solidFill>
+        <a:schemeClr val="lt1"/>
+      </a:solidFill>
+      <a:ln>
+        <a:solidFill>
+          <a:schemeClr val="dk1">
+            <a:lumMod val="25000"/>
+            <a:lumOff val="75000"/>
+          </a:schemeClr>
+        </a:solidFill>
+      </a:ln>
+    </cs:spPr>
+    <cs:defRPr sz="1197" kern="1200"/>
+    <cs:bodyPr rot="0" spcFirstLastPara="1" vertOverflow="clip" horzOverflow="clip" vert="horz" wrap="square" lIns="36576" tIns="18288" rIns="36576" bIns="18288" anchor="ctr" anchorCtr="1">
+      <a:spAutoFit/>
+    </cs:bodyPr>
+  </cs:dataLabelCallout>
+  <cs:dataPoint>
+    <cs:lnRef idx="0"/>
+    <cs:fillRef idx="1">
+      <cs:styleClr val="auto"/>
+    </cs:fillRef>
+    <cs:effectRef idx="0"/>
+    <cs:fontRef idx="minor">
+      <a:schemeClr val="tx1"/>
+    </cs:fontRef>
+    <cs:spPr>
+      <a:ln w="19050">
+        <a:solidFill>
+          <a:schemeClr val="lt1"/>
+        </a:solidFill>
+      </a:ln>
+    </cs:spPr>
+  </cs:dataPoint>
+  <cs:dataPoint3D>
+    <cs:lnRef idx="0"/>
+    <cs:fillRef idx="1">
+      <cs:styleClr val="auto"/>
+    </cs:fillRef>
+    <cs:effectRef idx="0"/>
+    <cs:fontRef idx="minor">
+      <a:schemeClr val="tx1"/>
+    </cs:fontRef>
+    <cs:spPr>
+      <a:ln w="25400">
+        <a:solidFill>
+          <a:schemeClr val="lt1"/>
+        </a:solidFill>
+      </a:ln>
+    </cs:spPr>
+  </cs:dataPoint3D>
+  <cs:dataPointLine>
+    <cs:lnRef idx="0">
+      <cs:styleClr val="auto"/>
+    </cs:lnRef>
+    <cs:fillRef idx="0"/>
+    <cs:effectRef idx="0"/>
+    <cs:fontRef idx="minor">
+      <a:schemeClr val="tx1"/>
+    </cs:fontRef>
+    <cs:spPr>
+      <a:ln w="28575" cap="rnd">
+        <a:solidFill>
+          <a:schemeClr val="phClr"/>
+        </a:solidFill>
+        <a:round/>
+      </a:ln>
+    </cs:spPr>
+  </cs:dataPointLine>
+  <cs:dataPointMarker>
+    <cs:lnRef idx="0">
+      <cs:styleClr val="auto"/>
+    </cs:lnRef>
+    <cs:fillRef idx="1">
+      <cs:styleClr val="auto"/>
+    </cs:fillRef>
+    <cs:effectRef idx="0"/>
+    <cs:fontRef idx="minor">
+      <a:schemeClr val="tx1"/>
+    </cs:fontRef>
+    <cs:spPr>
+      <a:ln w="9525">
+        <a:solidFill>
+          <a:schemeClr val="phClr"/>
+        </a:solidFill>
+      </a:ln>
+    </cs:spPr>
+  </cs:dataPointMarker>
+  <cs:dataPointMarkerLayout symbol="circle" size="5"/>
+  <cs:dataPointWireframe>
+    <cs:lnRef idx="0">
+      <cs:styleClr val="auto"/>
+    </cs:lnRef>
+    <cs:fillRef idx="0"/>
+    <cs:effectRef idx="0"/>
+    <cs:fontRef idx="minor">
+      <a:schemeClr val="tx1"/>
+    </cs:fontRef>
+    <cs:spPr>
+      <a:ln w="9525" cap="rnd">
+        <a:solidFill>
+          <a:schemeClr val="phClr"/>
+        </a:solidFill>
+        <a:round/>
+      </a:ln>
+    </cs:spPr>
+  </cs:dataPointWireframe>
+  <cs:dataTable>
+    <cs:lnRef idx="0"/>
+    <cs:fillRef idx="0"/>
+    <cs:effectRef idx="0"/>
+    <cs:fontRef idx="minor">
+      <a:schemeClr val="tx1">
+        <a:lumMod val="65000"/>
+        <a:lumOff val="35000"/>
+      </a:schemeClr>
+    </cs:fontRef>
+    <cs:spPr>
+      <a:noFill/>
+      <a:ln w="9525" cap="flat" cmpd="sng" algn="ctr">
+        <a:solidFill>
+          <a:schemeClr val="tx1">
+            <a:lumMod val="15000"/>
+            <a:lumOff val="85000"/>
+          </a:schemeClr>
+        </a:solidFill>
+        <a:round/>
+      </a:ln>
+    </cs:spPr>
+    <cs:defRPr sz="1197" kern="1200"/>
+  </cs:dataTable>
+  <cs:downBar>
+    <cs:lnRef idx="0"/>
+    <cs:fillRef idx="0"/>
+    <cs:effectRef idx="0"/>
+    <cs:fontRef idx="minor">
+      <a:schemeClr val="tx1"/>
+    </cs:fontRef>
+    <cs:spPr>
+      <a:solidFill>
+        <a:schemeClr val="dk1">
+          <a:lumMod val="75000"/>
+          <a:lumOff val="25000"/>
+        </a:schemeClr>
+      </a:solidFill>
+      <a:ln w="9525" cap="flat" cmpd="sng" algn="ctr">
+        <a:solidFill>
+          <a:schemeClr val="tx1">
+            <a:lumMod val="65000"/>
+            <a:lumOff val="35000"/>
+          </a:schemeClr>
+        </a:solidFill>
+        <a:round/>
+      </a:ln>
+    </cs:spPr>
+  </cs:downBar>
+  <cs:dropLine>
+    <cs:lnRef idx="0"/>
+    <cs:fillRef idx="0"/>
+    <cs:effectRef idx="0"/>
+    <cs:fontRef idx="minor">
+      <a:schemeClr val="tx1"/>
+    </cs:fontRef>
+    <cs:spPr>
+      <a:ln w="9525" cap="flat" cmpd="sng" algn="ctr">
+        <a:solidFill>
+          <a:schemeClr val="tx1">
+            <a:lumMod val="35000"/>
+            <a:lumOff val="65000"/>
+          </a:schemeClr>
+        </a:solidFill>
+        <a:round/>
+      </a:ln>
+    </cs:spPr>
+  </cs:dropLine>
+  <cs:errorBar>
+    <cs:lnRef idx="0"/>
+    <cs:fillRef idx="0"/>
+    <cs:effectRef idx="0"/>
+    <cs:fontRef idx="minor">
+      <a:schemeClr val="tx1"/>
+    </cs:fontRef>
+    <cs:spPr>
+      <a:ln w="9525" cap="flat" cmpd="sng" algn="ctr">
+        <a:solidFill>
+          <a:schemeClr val="tx1">
+            <a:lumMod val="65000"/>
+            <a:lumOff val="35000"/>
+          </a:schemeClr>
+        </a:solidFill>
+        <a:round/>
+      </a:ln>
+    </cs:spPr>
+  </cs:errorBar>
+  <cs:floor>
+    <cs:lnRef idx="0"/>
+    <cs:fillRef idx="0"/>
+    <cs:effectRef idx="0"/>
+    <cs:fontRef idx="minor">
+      <a:schemeClr val="tx1"/>
+    </cs:fontRef>
+    <cs:spPr>
+      <a:noFill/>
+      <a:ln>
+        <a:noFill/>
+      </a:ln>
+    </cs:spPr>
+  </cs:floor>
+  <cs:gridlineMajor>
+    <cs:lnRef idx="0"/>
+    <cs:fillRef idx="0"/>
+    <cs:effectRef idx="0"/>
+    <cs:fontRef idx="minor">
+      <a:schemeClr val="tx1"/>
+    </cs:fontRef>
+    <cs:spPr>
+      <a:ln w="9525" cap="flat" cmpd="sng" algn="ctr">
+        <a:solidFill>
+          <a:schemeClr val="tx1">
+            <a:lumMod val="15000"/>
+            <a:lumOff val="85000"/>
+          </a:schemeClr>
+        </a:solidFill>
+        <a:round/>
+      </a:ln>
+    </cs:spPr>
+  </cs:gridlineMajor>
+  <cs:gridlineMinor>
+    <cs:lnRef idx="0"/>
+    <cs:fillRef idx="0"/>
+    <cs:effectRef idx="0"/>
+    <cs:fontRef idx="minor">
+      <a:schemeClr val="tx1"/>
+    </cs:fontRef>
+    <cs:spPr>
+      <a:ln w="9525" cap="flat" cmpd="sng" algn="ctr">
+        <a:solidFill>
+          <a:schemeClr val="tx1">
+            <a:lumMod val="5000"/>
+            <a:lumOff val="95000"/>
+          </a:schemeClr>
+        </a:solidFill>
+        <a:round/>
+      </a:ln>
+    </cs:spPr>
+  </cs:gridlineMinor>
+  <cs:hiLoLine>
+    <cs:lnRef idx="0"/>
+    <cs:fillRef idx="0"/>
+    <cs:effectRef idx="0"/>
+    <cs:fontRef idx="minor">
+      <a:schemeClr val="tx1"/>
+    </cs:fontRef>
+    <cs:spPr>
+      <a:ln w="9525" cap="flat" cmpd="sng" algn="ctr">
+        <a:solidFill>
+          <a:schemeClr val="tx1">
+            <a:lumMod val="50000"/>
+            <a:lumOff val="50000"/>
+          </a:schemeClr>
+        </a:solidFill>
+        <a:round/>
+      </a:ln>
+    </cs:spPr>
+  </cs:hiLoLine>
+  <cs:leaderLine>
+    <cs:lnRef idx="0"/>
+    <cs:fillRef idx="0"/>
+    <cs:effectRef idx="0"/>
+    <cs:fontRef idx="minor">
+      <a:schemeClr val="tx1"/>
+    </cs:fontRef>
+    <cs:spPr>
+      <a:ln w="9525" cap="flat" cmpd="sng" algn="ctr">
+        <a:solidFill>
+          <a:schemeClr val="tx1">
+            <a:lumMod val="35000"/>
+            <a:lumOff val="65000"/>
+          </a:schemeClr>
+        </a:solidFill>
+        <a:round/>
+      </a:ln>
+    </cs:spPr>
+  </cs:leaderLine>
+  <cs:legend>
+    <cs:lnRef idx="0"/>
+    <cs:fillRef idx="0"/>
+    <cs:effectRef idx="0"/>
+    <cs:fontRef idx="minor">
+      <a:schemeClr val="tx1">
+        <a:lumMod val="65000"/>
+        <a:lumOff val="35000"/>
+      </a:schemeClr>
+    </cs:fontRef>
+    <cs:defRPr sz="1197" kern="1200"/>
+  </cs:legend>
+  <cs:plotArea mods="allowNoFillOverride allowNoLineOverride">
+    <cs:lnRef idx="0"/>
+    <cs:fillRef idx="0"/>
+    <cs:effectRef idx="0"/>
+    <cs:fontRef idx="minor">
+      <a:schemeClr val="tx1"/>
+    </cs:fontRef>
+  </cs:plotArea>
+  <cs:plotArea3D mods="allowNoFillOverride allowNoLineOverride">
+    <cs:lnRef idx="0"/>
+    <cs:fillRef idx="0"/>
+    <cs:effectRef idx="0"/>
+    <cs:fontRef idx="minor">
+      <a:schemeClr val="tx1"/>
+    </cs:fontRef>
+  </cs:plotArea3D>
+  <cs:seriesAxis>
+    <cs:lnRef idx="0"/>
+    <cs:fillRef idx="0"/>
+    <cs:effectRef idx="0"/>
+    <cs:fontRef idx="minor">
+      <a:schemeClr val="tx1">
+        <a:lumMod val="65000"/>
+        <a:lumOff val="35000"/>
+      </a:schemeClr>
+    </cs:fontRef>
+    <cs:defRPr sz="1197" kern="1200"/>
+  </cs:seriesAxis>
+  <cs:seriesLine>
+    <cs:lnRef idx="0"/>
+    <cs:fillRef idx="0"/>
+    <cs:effectRef idx="0"/>
+    <cs:fontRef idx="minor">
+      <a:schemeClr val="tx1"/>
+    </cs:fontRef>
+    <cs:spPr>
+      <a:ln w="9525" cap="flat" cmpd="sng" algn="ctr">
+        <a:solidFill>
+          <a:schemeClr val="tx1">
+            <a:lumMod val="35000"/>
+            <a:lumOff val="65000"/>
+          </a:schemeClr>
+        </a:solidFill>
+        <a:round/>
+      </a:ln>
+    </cs:spPr>
+  </cs:seriesLine>
+  <cs:title>
+    <cs:lnRef idx="0"/>
+    <cs:fillRef idx="0"/>
+    <cs:effectRef idx="0"/>
+    <cs:fontRef idx="minor">
+      <a:schemeClr val="tx1">
+        <a:lumMod val="65000"/>
+        <a:lumOff val="35000"/>
+      </a:schemeClr>
+    </cs:fontRef>
+    <cs:defRPr sz="1862" b="0" kern="1200" spc="0" baseline="0"/>
+  </cs:title>
+  <cs:trendline>
+    <cs:lnRef idx="0">
+      <cs:styleClr val="auto"/>
+    </cs:lnRef>
+    <cs:fillRef idx="0"/>
+    <cs:effectRef idx="0"/>
+    <cs:fontRef idx="minor">
+      <a:schemeClr val="tx1"/>
+    </cs:fontRef>
+    <cs:spPr>
+      <a:ln w="19050" cap="rnd">
+        <a:solidFill>
+          <a:schemeClr val="phClr"/>
+        </a:solidFill>
+        <a:prstDash val="sysDot"/>
+      </a:ln>
+    </cs:spPr>
+  </cs:trendline>
+  <cs:trendlineLabel>
+    <cs:lnRef idx="0"/>
+    <cs:fillRef idx="0"/>
+    <cs:effectRef idx="0"/>
+    <cs:fontRef idx="minor">
+      <a:schemeClr val="tx1">
+        <a:lumMod val="65000"/>
+        <a:lumOff val="35000"/>
+      </a:schemeClr>
+    </cs:fontRef>
+    <cs:defRPr sz="1197" kern="1200"/>
+  </cs:trendlineLabel>
+  <cs:upBar>
+    <cs:lnRef idx="0"/>
+    <cs:fillRef idx="0"/>
+    <cs:effectRef idx="0"/>
+    <cs:fontRef idx="minor">
+      <a:schemeClr val="tx1"/>
+    </cs:fontRef>
+    <cs:spPr>
+      <a:solidFill>
+        <a:schemeClr val="lt1"/>
+      </a:solidFill>
+      <a:ln w="9525" cap="flat" cmpd="sng" algn="ctr">
+        <a:solidFill>
+          <a:schemeClr val="tx1">
+            <a:lumMod val="65000"/>
+            <a:lumOff val="35000"/>
+          </a:schemeClr>
+        </a:solidFill>
+        <a:round/>
+      </a:ln>
+    </cs:spPr>
+  </cs:upBar>
+  <cs:valueAxis>
+    <cs:lnRef idx="0"/>
+    <cs:fillRef idx="0"/>
+    <cs:effectRef idx="0"/>
+    <cs:fontRef idx="minor">
+      <a:schemeClr val="tx1">
+        <a:lumMod val="65000"/>
+        <a:lumOff val="35000"/>
+      </a:schemeClr>
+    </cs:fontRef>
+    <cs:defRPr sz="1197" kern="1200"/>
+  </cs:valueAxis>
+  <cs:wall>
+    <cs:lnRef idx="0"/>
+    <cs:fillRef idx="0"/>
+    <cs:effectRef idx="0"/>
+    <cs:fontRef idx="minor">
+      <a:schemeClr val="tx1"/>
+    </cs:fontRef>
+    <cs:spPr>
+      <a:noFill/>
+      <a:ln>
+        <a:noFill/>
+      </a:ln>
+    </cs:spPr>
+  </cs:wall>
+</cs:chartStyle>
+</file>
+
+<file path=ppt/charts/style3.xml><?xml version="1.0" encoding="utf-8"?>
 <cs:chartStyle xmlns:cs="http://schemas.microsoft.com/office/drawing/2012/chartStyle" xmlns:a="http://schemas.openxmlformats.org/drawingml/2006/main" id="251">
   <cs:axisTitle>
     <cs:lnRef idx="0"/>
@@ -1946,7 +2742,7 @@
           <a:p>
             <a:fld id="{B37FD96D-3C44-6D4C-BFBE-2778F9D3FC86}" type="datetimeFigureOut">
               <a:rPr lang="en-AU" smtClean="0"/>
-              <a:t>3/11/2023</a:t>
+              <a:t>13/2/2024</a:t>
             </a:fld>
             <a:endParaRPr lang="en-AU"/>
           </a:p>
@@ -2146,7 +2942,7 @@
           <a:p>
             <a:fld id="{B37FD96D-3C44-6D4C-BFBE-2778F9D3FC86}" type="datetimeFigureOut">
               <a:rPr lang="en-AU" smtClean="0"/>
-              <a:t>3/11/2023</a:t>
+              <a:t>13/2/2024</a:t>
             </a:fld>
             <a:endParaRPr lang="en-AU"/>
           </a:p>
@@ -2356,7 +3152,7 @@
           <a:p>
             <a:fld id="{B37FD96D-3C44-6D4C-BFBE-2778F9D3FC86}" type="datetimeFigureOut">
               <a:rPr lang="en-AU" smtClean="0"/>
-              <a:t>3/11/2023</a:t>
+              <a:t>13/2/2024</a:t>
             </a:fld>
             <a:endParaRPr lang="en-AU"/>
           </a:p>
@@ -2556,7 +3352,7 @@
           <a:p>
             <a:fld id="{B37FD96D-3C44-6D4C-BFBE-2778F9D3FC86}" type="datetimeFigureOut">
               <a:rPr lang="en-AU" smtClean="0"/>
-              <a:t>3/11/2023</a:t>
+              <a:t>13/2/2024</a:t>
             </a:fld>
             <a:endParaRPr lang="en-AU"/>
           </a:p>
@@ -2832,7 +3628,7 @@
           <a:p>
             <a:fld id="{B37FD96D-3C44-6D4C-BFBE-2778F9D3FC86}" type="datetimeFigureOut">
               <a:rPr lang="en-AU" smtClean="0"/>
-              <a:t>3/11/2023</a:t>
+              <a:t>13/2/2024</a:t>
             </a:fld>
             <a:endParaRPr lang="en-AU"/>
           </a:p>
@@ -3100,7 +3896,7 @@
           <a:p>
             <a:fld id="{B37FD96D-3C44-6D4C-BFBE-2778F9D3FC86}" type="datetimeFigureOut">
               <a:rPr lang="en-AU" smtClean="0"/>
-              <a:t>3/11/2023</a:t>
+              <a:t>13/2/2024</a:t>
             </a:fld>
             <a:endParaRPr lang="en-AU"/>
           </a:p>
@@ -3515,7 +4311,7 @@
           <a:p>
             <a:fld id="{B37FD96D-3C44-6D4C-BFBE-2778F9D3FC86}" type="datetimeFigureOut">
               <a:rPr lang="en-AU" smtClean="0"/>
-              <a:t>3/11/2023</a:t>
+              <a:t>13/2/2024</a:t>
             </a:fld>
             <a:endParaRPr lang="en-AU"/>
           </a:p>
@@ -3657,7 +4453,7 @@
           <a:p>
             <a:fld id="{B37FD96D-3C44-6D4C-BFBE-2778F9D3FC86}" type="datetimeFigureOut">
               <a:rPr lang="en-AU" smtClean="0"/>
-              <a:t>3/11/2023</a:t>
+              <a:t>13/2/2024</a:t>
             </a:fld>
             <a:endParaRPr lang="en-AU"/>
           </a:p>
@@ -3770,7 +4566,7 @@
           <a:p>
             <a:fld id="{B37FD96D-3C44-6D4C-BFBE-2778F9D3FC86}" type="datetimeFigureOut">
               <a:rPr lang="en-AU" smtClean="0"/>
-              <a:t>3/11/2023</a:t>
+              <a:t>13/2/2024</a:t>
             </a:fld>
             <a:endParaRPr lang="en-AU"/>
           </a:p>
@@ -4083,7 +4879,7 @@
           <a:p>
             <a:fld id="{B37FD96D-3C44-6D4C-BFBE-2778F9D3FC86}" type="datetimeFigureOut">
               <a:rPr lang="en-AU" smtClean="0"/>
-              <a:t>3/11/2023</a:t>
+              <a:t>13/2/2024</a:t>
             </a:fld>
             <a:endParaRPr lang="en-AU"/>
           </a:p>
@@ -4372,7 +5168,7 @@
           <a:p>
             <a:fld id="{B37FD96D-3C44-6D4C-BFBE-2778F9D3FC86}" type="datetimeFigureOut">
               <a:rPr lang="en-AU" smtClean="0"/>
-              <a:t>3/11/2023</a:t>
+              <a:t>13/2/2024</a:t>
             </a:fld>
             <a:endParaRPr lang="en-AU"/>
           </a:p>
@@ -4615,7 +5411,7 @@
           <a:p>
             <a:fld id="{B37FD96D-3C44-6D4C-BFBE-2778F9D3FC86}" type="datetimeFigureOut">
               <a:rPr lang="en-AU" smtClean="0"/>
-              <a:t>3/11/2023</a:t>
+              <a:t>13/2/2024</a:t>
             </a:fld>
             <a:endParaRPr lang="en-AU"/>
           </a:p>
@@ -5045,14 +5841,14 @@
           <p:nvPr>
             <p:extLst>
               <p:ext uri="{D42A27DB-BD31-4B8C-83A1-F6EECF244321}">
-                <p14:modId xmlns:p14="http://schemas.microsoft.com/office/powerpoint/2010/main" val="1196292659"/>
+                <p14:modId xmlns:p14="http://schemas.microsoft.com/office/powerpoint/2010/main" val="1272561393"/>
               </p:ext>
             </p:extLst>
           </p:nvPr>
         </p:nvGraphicFramePr>
         <p:xfrm>
-          <a:off x="6688951" y="776087"/>
-          <a:ext cx="5694869" cy="4912473"/>
+          <a:off x="7768543" y="118794"/>
+          <a:ext cx="4110776" cy="3900614"/>
         </p:xfrm>
         <a:graphic>
           <a:graphicData uri="http://schemas.openxmlformats.org/drawingml/2006/chart">
@@ -5073,18 +5869,46 @@
           <p:nvPr>
             <p:extLst>
               <p:ext uri="{D42A27DB-BD31-4B8C-83A1-F6EECF244321}">
-                <p14:modId xmlns:p14="http://schemas.microsoft.com/office/powerpoint/2010/main" val="2855728213"/>
+                <p14:modId xmlns:p14="http://schemas.microsoft.com/office/powerpoint/2010/main" val="1232534111"/>
               </p:ext>
             </p:extLst>
           </p:nvPr>
         </p:nvGraphicFramePr>
         <p:xfrm>
-          <a:off x="-2372452" y="746489"/>
-          <a:ext cx="10180710" cy="5418667"/>
+          <a:off x="-7105660" y="118794"/>
+          <a:ext cx="18865042" cy="4332881"/>
         </p:xfrm>
         <a:graphic>
           <a:graphicData uri="http://schemas.openxmlformats.org/drawingml/2006/chart">
             <c:chart xmlns:c="http://schemas.openxmlformats.org/drawingml/2006/chart" xmlns:r="http://schemas.openxmlformats.org/officeDocument/2006/relationships" r:id="rId3"/>
+          </a:graphicData>
+        </a:graphic>
+      </p:graphicFrame>
+      <p:graphicFrame>
+        <p:nvGraphicFramePr>
+          <p:cNvPr id="2" name="Chart 1">
+            <a:extLst>
+              <a:ext uri="{FF2B5EF4-FFF2-40B4-BE49-F238E27FC236}">
+                <a16:creationId xmlns:a16="http://schemas.microsoft.com/office/drawing/2014/main" id="{F2B1F11A-4946-5395-3108-AB3239D642D1}"/>
+              </a:ext>
+            </a:extLst>
+          </p:cNvPr>
+          <p:cNvGraphicFramePr/>
+          <p:nvPr>
+            <p:extLst>
+              <p:ext uri="{D42A27DB-BD31-4B8C-83A1-F6EECF244321}">
+                <p14:modId xmlns:p14="http://schemas.microsoft.com/office/powerpoint/2010/main" val="2289965744"/>
+              </p:ext>
+            </p:extLst>
+          </p:nvPr>
+        </p:nvGraphicFramePr>
+        <p:xfrm>
+          <a:off x="3835073" y="118794"/>
+          <a:ext cx="4521854" cy="3900614"/>
+        </p:xfrm>
+        <a:graphic>
+          <a:graphicData uri="http://schemas.openxmlformats.org/drawingml/2006/chart">
+            <c:chart xmlns:c="http://schemas.openxmlformats.org/drawingml/2006/chart" xmlns:r="http://schemas.openxmlformats.org/officeDocument/2006/relationships" r:id="rId4"/>
           </a:graphicData>
         </a:graphic>
       </p:graphicFrame>

</xml_diff>